<commit_message>
feat: update documentation (#48)
</commit_message>
<xml_diff>
--- a/docs/collateral.pptx
+++ b/docs/collateral.pptx
@@ -6,12 +6,13 @@
   </p:sldMasterIdLst>
   <p:sldIdLst>
     <p:sldId id="256" r:id="rId2"/>
-    <p:sldId id="257" r:id="rId3"/>
-    <p:sldId id="259" r:id="rId4"/>
-    <p:sldId id="260" r:id="rId5"/>
-    <p:sldId id="265" r:id="rId6"/>
-    <p:sldId id="262" r:id="rId7"/>
-    <p:sldId id="258" r:id="rId8"/>
+    <p:sldId id="266" r:id="rId3"/>
+    <p:sldId id="257" r:id="rId4"/>
+    <p:sldId id="259" r:id="rId5"/>
+    <p:sldId id="260" r:id="rId6"/>
+    <p:sldId id="265" r:id="rId7"/>
+    <p:sldId id="262" r:id="rId8"/>
+    <p:sldId id="258" r:id="rId9"/>
   </p:sldIdLst>
   <p:sldSz cx="12192000" cy="6858000"/>
   <p:notesSz cx="6797675" cy="9926638"/>
@@ -265,7 +266,7 @@
           <a:p>
             <a:fld id="{D070F067-AAA7-4FDD-83BF-262AEB4821DD}" type="datetimeFigureOut">
               <a:rPr lang="en-US" smtClean="0"/>
-              <a:t>10/20/2021</a:t>
+              <a:t>9/2/2023</a:t>
             </a:fld>
             <a:endParaRPr lang="en-US"/>
           </a:p>
@@ -463,7 +464,7 @@
           <a:p>
             <a:fld id="{D070F067-AAA7-4FDD-83BF-262AEB4821DD}" type="datetimeFigureOut">
               <a:rPr lang="en-US" smtClean="0"/>
-              <a:t>10/20/2021</a:t>
+              <a:t>9/2/2023</a:t>
             </a:fld>
             <a:endParaRPr lang="en-US"/>
           </a:p>
@@ -671,7 +672,7 @@
           <a:p>
             <a:fld id="{D070F067-AAA7-4FDD-83BF-262AEB4821DD}" type="datetimeFigureOut">
               <a:rPr lang="en-US" smtClean="0"/>
-              <a:t>10/20/2021</a:t>
+              <a:t>9/2/2023</a:t>
             </a:fld>
             <a:endParaRPr lang="en-US"/>
           </a:p>
@@ -869,7 +870,7 @@
           <a:p>
             <a:fld id="{D070F067-AAA7-4FDD-83BF-262AEB4821DD}" type="datetimeFigureOut">
               <a:rPr lang="en-US" smtClean="0"/>
-              <a:t>10/20/2021</a:t>
+              <a:t>9/2/2023</a:t>
             </a:fld>
             <a:endParaRPr lang="en-US"/>
           </a:p>
@@ -1144,7 +1145,7 @@
           <a:p>
             <a:fld id="{D070F067-AAA7-4FDD-83BF-262AEB4821DD}" type="datetimeFigureOut">
               <a:rPr lang="en-US" smtClean="0"/>
-              <a:t>10/20/2021</a:t>
+              <a:t>9/2/2023</a:t>
             </a:fld>
             <a:endParaRPr lang="en-US"/>
           </a:p>
@@ -1409,7 +1410,7 @@
           <a:p>
             <a:fld id="{D070F067-AAA7-4FDD-83BF-262AEB4821DD}" type="datetimeFigureOut">
               <a:rPr lang="en-US" smtClean="0"/>
-              <a:t>10/20/2021</a:t>
+              <a:t>9/2/2023</a:t>
             </a:fld>
             <a:endParaRPr lang="en-US"/>
           </a:p>
@@ -1821,7 +1822,7 @@
           <a:p>
             <a:fld id="{D070F067-AAA7-4FDD-83BF-262AEB4821DD}" type="datetimeFigureOut">
               <a:rPr lang="en-US" smtClean="0"/>
-              <a:t>10/20/2021</a:t>
+              <a:t>9/2/2023</a:t>
             </a:fld>
             <a:endParaRPr lang="en-US"/>
           </a:p>
@@ -1962,7 +1963,7 @@
           <a:p>
             <a:fld id="{D070F067-AAA7-4FDD-83BF-262AEB4821DD}" type="datetimeFigureOut">
               <a:rPr lang="en-US" smtClean="0"/>
-              <a:t>10/20/2021</a:t>
+              <a:t>9/2/2023</a:t>
             </a:fld>
             <a:endParaRPr lang="en-US"/>
           </a:p>
@@ -2075,7 +2076,7 @@
           <a:p>
             <a:fld id="{D070F067-AAA7-4FDD-83BF-262AEB4821DD}" type="datetimeFigureOut">
               <a:rPr lang="en-US" smtClean="0"/>
-              <a:t>10/20/2021</a:t>
+              <a:t>9/2/2023</a:t>
             </a:fld>
             <a:endParaRPr lang="en-US"/>
           </a:p>
@@ -2386,7 +2387,7 @@
           <a:p>
             <a:fld id="{D070F067-AAA7-4FDD-83BF-262AEB4821DD}" type="datetimeFigureOut">
               <a:rPr lang="en-US" smtClean="0"/>
-              <a:t>10/20/2021</a:t>
+              <a:t>9/2/2023</a:t>
             </a:fld>
             <a:endParaRPr lang="en-US"/>
           </a:p>
@@ -2674,7 +2675,7 @@
           <a:p>
             <a:fld id="{D070F067-AAA7-4FDD-83BF-262AEB4821DD}" type="datetimeFigureOut">
               <a:rPr lang="en-US" smtClean="0"/>
-              <a:t>10/20/2021</a:t>
+              <a:t>9/2/2023</a:t>
             </a:fld>
             <a:endParaRPr lang="en-US"/>
           </a:p>
@@ -2915,7 +2916,7 @@
           <a:p>
             <a:fld id="{D070F067-AAA7-4FDD-83BF-262AEB4821DD}" type="datetimeFigureOut">
               <a:rPr lang="en-US" smtClean="0"/>
-              <a:t>10/20/2021</a:t>
+              <a:t>9/2/2023</a:t>
             </a:fld>
             <a:endParaRPr lang="en-US"/>
           </a:p>
@@ -3334,10 +3335,10 @@
       </p:grpSpPr>
       <p:pic>
         <p:nvPicPr>
-          <p:cNvPr id="5" name="Picture 4">
-            <a:extLst>
-              <a:ext uri="{FF2B5EF4-FFF2-40B4-BE49-F238E27FC236}">
-                <a16:creationId xmlns:a16="http://schemas.microsoft.com/office/drawing/2014/main" id="{E03A8171-28C6-419F-B6EF-38E473FA8238}"/>
+          <p:cNvPr id="2" name="Picture 1">
+            <a:extLst>
+              <a:ext uri="{FF2B5EF4-FFF2-40B4-BE49-F238E27FC236}">
+                <a16:creationId xmlns:a16="http://schemas.microsoft.com/office/drawing/2014/main" id="{8F140E12-B3CA-7C95-DBEB-50CCE6E75213}"/>
               </a:ext>
             </a:extLst>
           </p:cNvPr>
@@ -3354,25 +3355,49 @@
         </p:blipFill>
         <p:spPr>
           <a:xfrm>
-            <a:off x="904875" y="669466"/>
-            <a:ext cx="4581408" cy="2461653"/>
+            <a:off x="2875597" y="199072"/>
+            <a:ext cx="5915025" cy="2219325"/>
           </a:xfrm>
           <a:prstGeom prst="rect">
             <a:avLst/>
           </a:prstGeom>
-          <a:ln>
+          <a:solidFill>
+            <a:srgbClr val="FFFFFF">
+              <a:shade val="85000"/>
+            </a:srgbClr>
+          </a:solidFill>
+          <a:ln w="190500" cap="rnd">
             <a:solidFill>
-              <a:schemeClr val="tx1"/>
+              <a:srgbClr val="FFFFFF"/>
             </a:solidFill>
           </a:ln>
+          <a:effectLst>
+            <a:outerShdw blurRad="50000" algn="tl" rotWithShape="0">
+              <a:srgbClr val="000000">
+                <a:alpha val="41000"/>
+              </a:srgbClr>
+            </a:outerShdw>
+          </a:effectLst>
+          <a:scene3d>
+            <a:camera prst="orthographicFront"/>
+            <a:lightRig rig="twoPt" dir="t">
+              <a:rot lat="0" lon="0" rev="7800000"/>
+            </a:lightRig>
+          </a:scene3d>
+          <a:sp3d contourW="6350">
+            <a:bevelT w="50800" h="16510"/>
+            <a:contourClr>
+              <a:srgbClr val="C0C0C0"/>
+            </a:contourClr>
+          </a:sp3d>
         </p:spPr>
       </p:pic>
       <p:pic>
         <p:nvPicPr>
-          <p:cNvPr id="7" name="Picture 6" descr="Graphical user interface, text, application&#10;&#10;Description automatically generated">
-            <a:extLst>
-              <a:ext uri="{FF2B5EF4-FFF2-40B4-BE49-F238E27FC236}">
-                <a16:creationId xmlns:a16="http://schemas.microsoft.com/office/drawing/2014/main" id="{510615D8-4F22-48E4-B084-EDA4EB8B3B14}"/>
+          <p:cNvPr id="3" name="Picture 2">
+            <a:extLst>
+              <a:ext uri="{FF2B5EF4-FFF2-40B4-BE49-F238E27FC236}">
+                <a16:creationId xmlns:a16="http://schemas.microsoft.com/office/drawing/2014/main" id="{5FA26356-3A41-7F76-3B6C-E9FACE9FEB35}"/>
               </a:ext>
             </a:extLst>
           </p:cNvPr>
@@ -3382,38 +3407,92 @@
           <p:nvPr/>
         </p:nvPicPr>
         <p:blipFill>
-          <a:blip r:embed="rId3">
-            <a:extLst>
-              <a:ext uri="{28A0092B-C50C-407E-A947-70E740481C1C}">
-                <a14:useLocalDpi xmlns:a14="http://schemas.microsoft.com/office/drawing/2010/main" val="0"/>
-              </a:ext>
-            </a:extLst>
-          </a:blip>
+          <a:blip r:embed="rId3"/>
           <a:stretch>
             <a:fillRect/>
           </a:stretch>
         </p:blipFill>
         <p:spPr>
           <a:xfrm>
-            <a:off x="6181817" y="669466"/>
-            <a:ext cx="4927710" cy="2449613"/>
+            <a:off x="2866071" y="4118138"/>
+            <a:ext cx="5934075" cy="2181225"/>
           </a:xfrm>
           <a:prstGeom prst="rect">
             <a:avLst/>
           </a:prstGeom>
-          <a:ln>
+          <a:solidFill>
+            <a:srgbClr val="FFFFFF">
+              <a:shade val="85000"/>
+            </a:srgbClr>
+          </a:solidFill>
+          <a:ln w="190500" cap="rnd">
             <a:solidFill>
-              <a:schemeClr val="tx1"/>
+              <a:srgbClr val="FFFFFF"/>
             </a:solidFill>
           </a:ln>
+          <a:effectLst>
+            <a:outerShdw blurRad="50000" algn="tl" rotWithShape="0">
+              <a:srgbClr val="000000">
+                <a:alpha val="41000"/>
+              </a:srgbClr>
+            </a:outerShdw>
+          </a:effectLst>
+          <a:scene3d>
+            <a:camera prst="orthographicFront"/>
+            <a:lightRig rig="twoPt" dir="t">
+              <a:rot lat="0" lon="0" rev="7800000"/>
+            </a:lightRig>
+          </a:scene3d>
+          <a:sp3d contourW="6350">
+            <a:bevelT w="50800" h="16510"/>
+            <a:contourClr>
+              <a:srgbClr val="C0C0C0"/>
+            </a:contourClr>
+          </a:sp3d>
         </p:spPr>
       </p:pic>
       <p:sp>
         <p:nvSpPr>
-          <p:cNvPr id="8" name="Arrow: Right 7">
-            <a:extLst>
-              <a:ext uri="{FF2B5EF4-FFF2-40B4-BE49-F238E27FC236}">
-                <a16:creationId xmlns:a16="http://schemas.microsoft.com/office/drawing/2014/main" id="{1F541422-64F2-46AD-8FD5-309EF193AB74}"/>
+          <p:cNvPr id="4" name="TextBox 3">
+            <a:extLst>
+              <a:ext uri="{FF2B5EF4-FFF2-40B4-BE49-F238E27FC236}">
+                <a16:creationId xmlns:a16="http://schemas.microsoft.com/office/drawing/2014/main" id="{C5974801-222C-98AA-EB00-8BB6996ACB08}"/>
+              </a:ext>
+            </a:extLst>
+          </p:cNvPr>
+          <p:cNvSpPr txBox="1"/>
+          <p:nvPr/>
+        </p:nvSpPr>
+        <p:spPr>
+          <a:xfrm>
+            <a:off x="3989177" y="3059668"/>
+            <a:ext cx="861903" cy="369332"/>
+          </a:xfrm>
+          <a:prstGeom prst="rect">
+            <a:avLst/>
+          </a:prstGeom>
+          <a:noFill/>
+        </p:spPr>
+        <p:txBody>
+          <a:bodyPr wrap="none" rtlCol="0">
+            <a:spAutoFit/>
+          </a:bodyPr>
+          <a:lstStyle/>
+          <a:p>
+            <a:r>
+              <a:rPr lang="en-US" dirty="0"/>
+              <a:t>archive</a:t>
+            </a:r>
+            <a:endParaRPr lang="nl-BE" dirty="0"/>
+          </a:p>
+        </p:txBody>
+      </p:sp>
+      <p:sp>
+        <p:nvSpPr>
+          <p:cNvPr id="6" name="Arrow: Right 5">
+            <a:extLst>
+              <a:ext uri="{FF2B5EF4-FFF2-40B4-BE49-F238E27FC236}">
+                <a16:creationId xmlns:a16="http://schemas.microsoft.com/office/drawing/2014/main" id="{0D99AA64-AFB4-9FC4-C23B-5AEE256A1709}"/>
               </a:ext>
             </a:extLst>
           </p:cNvPr>
@@ -3421,15 +3500,15 @@
           <p:nvPr/>
         </p:nvSpPr>
         <p:spPr>
-          <a:xfrm>
-            <a:off x="4506380" y="2052196"/>
-            <a:ext cx="3007607" cy="646771"/>
+          <a:xfrm rot="5400000">
+            <a:off x="4731542" y="2911317"/>
+            <a:ext cx="1039176" cy="800100"/>
           </a:xfrm>
           <a:prstGeom prst="rightArrow">
             <a:avLst/>
           </a:prstGeom>
           <a:solidFill>
-            <a:srgbClr val="FF0000"/>
+            <a:srgbClr val="0091E1"/>
           </a:solidFill>
           <a:ln>
             <a:noFill/>
@@ -3438,7 +3517,7 @@
         <p:style>
           <a:lnRef idx="2">
             <a:schemeClr val="accent1">
-              <a:shade val="50000"/>
+              <a:shade val="15000"/>
             </a:schemeClr>
           </a:lnRef>
           <a:fillRef idx="1">
@@ -3456,45 +3535,147 @@
           <a:lstStyle/>
           <a:p>
             <a:pPr algn="ctr"/>
+            <a:endParaRPr lang="nl-BE" dirty="0"/>
+          </a:p>
+        </p:txBody>
+      </p:sp>
+      <p:sp>
+        <p:nvSpPr>
+          <p:cNvPr id="9" name="Arrow: Right 8">
+            <a:extLst>
+              <a:ext uri="{FF2B5EF4-FFF2-40B4-BE49-F238E27FC236}">
+                <a16:creationId xmlns:a16="http://schemas.microsoft.com/office/drawing/2014/main" id="{87D3213C-88E1-EF9F-FE9D-D25E1DB544D7}"/>
+              </a:ext>
+            </a:extLst>
+          </p:cNvPr>
+          <p:cNvSpPr/>
+          <p:nvPr/>
+        </p:nvSpPr>
+        <p:spPr>
+          <a:xfrm rot="16200000">
+            <a:off x="5895498" y="2825117"/>
+            <a:ext cx="1039176" cy="800100"/>
+          </a:xfrm>
+          <a:prstGeom prst="rightArrow">
+            <a:avLst/>
+          </a:prstGeom>
+          <a:solidFill>
+            <a:srgbClr val="0091E1"/>
+          </a:solidFill>
+          <a:ln>
+            <a:noFill/>
+          </a:ln>
+        </p:spPr>
+        <p:style>
+          <a:lnRef idx="2">
+            <a:schemeClr val="accent1">
+              <a:shade val="15000"/>
+            </a:schemeClr>
+          </a:lnRef>
+          <a:fillRef idx="1">
+            <a:schemeClr val="accent1"/>
+          </a:fillRef>
+          <a:effectRef idx="0">
+            <a:schemeClr val="accent1"/>
+          </a:effectRef>
+          <a:fontRef idx="minor">
+            <a:schemeClr val="lt1"/>
+          </a:fontRef>
+        </p:style>
+        <p:txBody>
+          <a:bodyPr rtlCol="0" anchor="ctr"/>
+          <a:lstStyle/>
+          <a:p>
+            <a:pPr algn="ctr"/>
+            <a:endParaRPr lang="nl-BE" dirty="0"/>
+          </a:p>
+        </p:txBody>
+      </p:sp>
+      <p:sp>
+        <p:nvSpPr>
+          <p:cNvPr id="10" name="TextBox 9">
+            <a:extLst>
+              <a:ext uri="{FF2B5EF4-FFF2-40B4-BE49-F238E27FC236}">
+                <a16:creationId xmlns:a16="http://schemas.microsoft.com/office/drawing/2014/main" id="{9C7C871F-F060-301D-3DB1-8B8F3A0BD803}"/>
+              </a:ext>
+            </a:extLst>
+          </p:cNvPr>
+          <p:cNvSpPr txBox="1"/>
+          <p:nvPr/>
+        </p:nvSpPr>
+        <p:spPr>
+          <a:xfrm>
+            <a:off x="6815136" y="3083601"/>
+            <a:ext cx="853503" cy="369332"/>
+          </a:xfrm>
+          <a:prstGeom prst="rect">
+            <a:avLst/>
+          </a:prstGeom>
+          <a:noFill/>
+        </p:spPr>
+        <p:txBody>
+          <a:bodyPr wrap="none" rtlCol="0">
+            <a:spAutoFit/>
+          </a:bodyPr>
+          <a:lstStyle/>
+          <a:p>
             <a:r>
-              <a:rPr lang="nl-BE" dirty="0" err="1">
-                <a:latin typeface="Segoe UI" panose="020B0502040204020203" pitchFamily="34" charset="0"/>
-                <a:cs typeface="Segoe UI" panose="020B0502040204020203" pitchFamily="34" charset="0"/>
-              </a:rPr>
-              <a:t>After</a:t>
+              <a:rPr lang="en-US" dirty="0"/>
+              <a:t>restore</a:t>
             </a:r>
-            <a:r>
-              <a:rPr lang="nl-BE" dirty="0">
-                <a:latin typeface="Segoe UI" panose="020B0502040204020203" pitchFamily="34" charset="0"/>
-                <a:cs typeface="Segoe UI" panose="020B0502040204020203" pitchFamily="34" charset="0"/>
-              </a:rPr>
-              <a:t> running </a:t>
-            </a:r>
-            <a:r>
-              <a:rPr lang="nl-BE" dirty="0" err="1">
-                <a:latin typeface="Segoe UI" panose="020B0502040204020203" pitchFamily="34" charset="0"/>
-                <a:cs typeface="Segoe UI" panose="020B0502040204020203" pitchFamily="34" charset="0"/>
-              </a:rPr>
-              <a:t>arius</a:t>
-            </a:r>
-            <a:r>
-              <a:rPr lang="nl-BE" dirty="0">
-                <a:latin typeface="Segoe UI" panose="020B0502040204020203" pitchFamily="34" charset="0"/>
-                <a:cs typeface="Segoe UI" panose="020B0502040204020203" pitchFamily="34" charset="0"/>
-              </a:rPr>
-              <a:t> </a:t>
-            </a:r>
-            <a:r>
-              <a:rPr lang="nl-BE" dirty="0" err="1">
-                <a:latin typeface="Segoe UI" panose="020B0502040204020203" pitchFamily="34" charset="0"/>
-                <a:cs typeface="Segoe UI" panose="020B0502040204020203" pitchFamily="34" charset="0"/>
-              </a:rPr>
-              <a:t>archive</a:t>
-            </a:r>
-            <a:endParaRPr lang="en-US" dirty="0">
-              <a:latin typeface="Segoe UI" panose="020B0502040204020203" pitchFamily="34" charset="0"/>
-              <a:cs typeface="Segoe UI" panose="020B0502040204020203" pitchFamily="34" charset="0"/>
-            </a:endParaRPr>
+            <a:endParaRPr lang="nl-BE" dirty="0"/>
+          </a:p>
+        </p:txBody>
+      </p:sp>
+      <p:sp>
+        <p:nvSpPr>
+          <p:cNvPr id="11" name="Rectangle 10">
+            <a:extLst>
+              <a:ext uri="{FF2B5EF4-FFF2-40B4-BE49-F238E27FC236}">
+                <a16:creationId xmlns:a16="http://schemas.microsoft.com/office/drawing/2014/main" id="{E997EBB9-1577-46E5-E70A-44AA2B13097E}"/>
+              </a:ext>
+            </a:extLst>
+          </p:cNvPr>
+          <p:cNvSpPr/>
+          <p:nvPr/>
+        </p:nvSpPr>
+        <p:spPr>
+          <a:xfrm>
+            <a:off x="8048625" y="4962525"/>
+            <a:ext cx="755220" cy="1338268"/>
+          </a:xfrm>
+          <a:prstGeom prst="rect">
+            <a:avLst/>
+          </a:prstGeom>
+          <a:noFill/>
+          <a:ln>
+            <a:solidFill>
+              <a:srgbClr val="FF0000"/>
+            </a:solidFill>
+          </a:ln>
+        </p:spPr>
+        <p:style>
+          <a:lnRef idx="2">
+            <a:schemeClr val="accent1">
+              <a:shade val="15000"/>
+            </a:schemeClr>
+          </a:lnRef>
+          <a:fillRef idx="1">
+            <a:schemeClr val="accent1"/>
+          </a:fillRef>
+          <a:effectRef idx="0">
+            <a:schemeClr val="accent1"/>
+          </a:effectRef>
+          <a:fontRef idx="minor">
+            <a:schemeClr val="lt1"/>
+          </a:fontRef>
+        </p:style>
+        <p:txBody>
+          <a:bodyPr rtlCol="0" anchor="ctr"/>
+          <a:lstStyle/>
+          <a:p>
+            <a:pPr algn="ctr"/>
+            <a:endParaRPr lang="nl-BE"/>
           </a:p>
         </p:txBody>
       </p:sp>
@@ -3512,6 +3693,66 @@
 </file>
 
 <file path=ppt/slides/slide2.xml><?xml version="1.0" encoding="utf-8"?>
+<p:sld xmlns:a="http://schemas.openxmlformats.org/drawingml/2006/main" xmlns:r="http://schemas.openxmlformats.org/officeDocument/2006/relationships" xmlns:p="http://schemas.openxmlformats.org/presentationml/2006/main">
+  <p:cSld>
+    <p:spTree>
+      <p:nvGrpSpPr>
+        <p:cNvPr id="1" name=""/>
+        <p:cNvGrpSpPr/>
+        <p:nvPr/>
+      </p:nvGrpSpPr>
+      <p:grpSpPr>
+        <a:xfrm>
+          <a:off x="0" y="0"/>
+          <a:ext cx="0" cy="0"/>
+          <a:chOff x="0" y="0"/>
+          <a:chExt cx="0" cy="0"/>
+        </a:xfrm>
+      </p:grpSpPr>
+      <p:pic>
+        <p:nvPicPr>
+          <p:cNvPr id="4" name="Picture 3">
+            <a:extLst>
+              <a:ext uri="{FF2B5EF4-FFF2-40B4-BE49-F238E27FC236}">
+                <a16:creationId xmlns:a16="http://schemas.microsoft.com/office/drawing/2014/main" id="{87CD0C13-F65A-D154-DA57-B66677E85077}"/>
+              </a:ext>
+            </a:extLst>
+          </p:cNvPr>
+          <p:cNvPicPr>
+            <a:picLocks noChangeAspect="1"/>
+          </p:cNvPicPr>
+          <p:nvPr/>
+        </p:nvPicPr>
+        <p:blipFill>
+          <a:blip r:embed="rId2"/>
+          <a:stretch>
+            <a:fillRect/>
+          </a:stretch>
+        </p:blipFill>
+        <p:spPr>
+          <a:xfrm>
+            <a:off x="2306655" y="2221192"/>
+            <a:ext cx="6667500" cy="2762250"/>
+          </a:xfrm>
+          <a:prstGeom prst="rect">
+            <a:avLst/>
+          </a:prstGeom>
+        </p:spPr>
+      </p:pic>
+    </p:spTree>
+    <p:extLst>
+      <p:ext uri="{BB962C8B-B14F-4D97-AF65-F5344CB8AC3E}">
+        <p14:creationId xmlns:p14="http://schemas.microsoft.com/office/powerpoint/2010/main" val="2083026636"/>
+      </p:ext>
+    </p:extLst>
+  </p:cSld>
+  <p:clrMapOvr>
+    <a:masterClrMapping/>
+  </p:clrMapOvr>
+</p:sld>
+</file>
+
+<file path=ppt/slides/slide3.xml><?xml version="1.0" encoding="utf-8"?>
 <p:sld xmlns:a="http://schemas.openxmlformats.org/drawingml/2006/main" xmlns:r="http://schemas.openxmlformats.org/officeDocument/2006/relationships" xmlns:p="http://schemas.openxmlformats.org/presentationml/2006/main">
   <p:cSld>
     <p:spTree>
@@ -4649,7 +4890,7 @@
 </p:sld>
 </file>
 
-<file path=ppt/slides/slide3.xml><?xml version="1.0" encoding="utf-8"?>
+<file path=ppt/slides/slide4.xml><?xml version="1.0" encoding="utf-8"?>
 <p:sld xmlns:a="http://schemas.openxmlformats.org/drawingml/2006/main" xmlns:r="http://schemas.openxmlformats.org/officeDocument/2006/relationships" xmlns:p="http://schemas.openxmlformats.org/presentationml/2006/main">
   <p:cSld>
     <p:spTree>
@@ -6754,7 +6995,7 @@
 </p:sld>
 </file>
 
-<file path=ppt/slides/slide4.xml><?xml version="1.0" encoding="utf-8"?>
+<file path=ppt/slides/slide5.xml><?xml version="1.0" encoding="utf-8"?>
 <p:sld xmlns:a="http://schemas.openxmlformats.org/drawingml/2006/main" xmlns:r="http://schemas.openxmlformats.org/officeDocument/2006/relationships" xmlns:p="http://schemas.openxmlformats.org/presentationml/2006/main">
   <p:cSld>
     <p:spTree>
@@ -10344,7 +10585,7 @@
 </p:sld>
 </file>
 
-<file path=ppt/slides/slide5.xml><?xml version="1.0" encoding="utf-8"?>
+<file path=ppt/slides/slide6.xml><?xml version="1.0" encoding="utf-8"?>
 <p:sld xmlns:a="http://schemas.openxmlformats.org/drawingml/2006/main" xmlns:r="http://schemas.openxmlformats.org/officeDocument/2006/relationships" xmlns:p="http://schemas.openxmlformats.org/presentationml/2006/main">
   <p:cSld>
     <p:spTree>
@@ -16629,7 +16870,7 @@
 </p:sld>
 </file>
 
-<file path=ppt/slides/slide6.xml><?xml version="1.0" encoding="utf-8"?>
+<file path=ppt/slides/slide7.xml><?xml version="1.0" encoding="utf-8"?>
 <p:sld xmlns:a="http://schemas.openxmlformats.org/drawingml/2006/main" xmlns:r="http://schemas.openxmlformats.org/officeDocument/2006/relationships" xmlns:p="http://schemas.openxmlformats.org/presentationml/2006/main">
   <p:cSld>
     <p:spTree>
@@ -18000,7 +18241,7 @@
 </p:sld>
 </file>
 
-<file path=ppt/slides/slide7.xml><?xml version="1.0" encoding="utf-8"?>
+<file path=ppt/slides/slide8.xml><?xml version="1.0" encoding="utf-8"?>
 <p:sld xmlns:a="http://schemas.openxmlformats.org/drawingml/2006/main" xmlns:r="http://schemas.openxmlformats.org/officeDocument/2006/relationships" xmlns:p="http://schemas.openxmlformats.org/presentationml/2006/main">
   <p:cSld>
     <p:bg>

</xml_diff>